<commit_message>
Clean start to solution
</commit_message>
<xml_diff>
--- a/PowerPoint Presentation/NDCOslo-AsyncPatterns.pptx
+++ b/PowerPoint Presentation/NDCOslo-AsyncPatterns.pptx
@@ -231,7 +231,7 @@
           <a:p>
             <a:fld id="{C1FFFC81-A484-4051-B6DB-C84CD22DDA1B}" type="datetimeFigureOut">
               <a:rPr lang="en-GB" smtClean="0"/>
-              <a:t>03/06/2014</a:t>
+              <a:t>04/06/2014</a:t>
             </a:fld>
             <a:endParaRPr lang="en-GB"/>
           </a:p>
@@ -526,6 +526,995 @@
             <p:ph type="sldImg"/>
           </p:nvPr>
         </p:nvSpPr>
+        <p:spPr/>
+      </p:sp>
+      <p:sp>
+        <p:nvSpPr>
+          <p:cNvPr id="3" name="Notes Placeholder 2"/>
+          <p:cNvSpPr>
+            <a:spLocks noGrp="1"/>
+          </p:cNvSpPr>
+          <p:nvPr>
+            <p:ph type="body" idx="1"/>
+          </p:nvPr>
+        </p:nvSpPr>
+        <p:spPr/>
+        <p:txBody>
+          <a:bodyPr/>
+          <a:lstStyle/>
+          <a:p>
+            <a:endParaRPr lang="en-GB"/>
+          </a:p>
+        </p:txBody>
+      </p:sp>
+      <p:sp>
+        <p:nvSpPr>
+          <p:cNvPr id="4" name="Slide Number Placeholder 3"/>
+          <p:cNvSpPr>
+            <a:spLocks noGrp="1"/>
+          </p:cNvSpPr>
+          <p:nvPr>
+            <p:ph type="sldNum" sz="quarter" idx="10"/>
+          </p:nvPr>
+        </p:nvSpPr>
+        <p:spPr/>
+        <p:txBody>
+          <a:bodyPr/>
+          <a:lstStyle/>
+          <a:p>
+            <a:fld id="{A4F91ECB-8CB0-401D-A46B-039D51CB393E}" type="slidenum">
+              <a:rPr lang="en-GB" smtClean="0"/>
+              <a:t>1</a:t>
+            </a:fld>
+            <a:endParaRPr lang="en-GB"/>
+          </a:p>
+        </p:txBody>
+      </p:sp>
+    </p:spTree>
+    <p:extLst>
+      <p:ext uri="{BB962C8B-B14F-4D97-AF65-F5344CB8AC3E}">
+        <p14:creationId xmlns:p14="http://schemas.microsoft.com/office/powerpoint/2010/main" val="2795555501"/>
+      </p:ext>
+    </p:extLst>
+  </p:cSld>
+  <p:clrMapOvr>
+    <a:masterClrMapping/>
+  </p:clrMapOvr>
+</p:notes>
+</file>
+
+<file path=ppt/notesSlides/notesSlide10.xml><?xml version="1.0" encoding="utf-8"?>
+<p:notes xmlns:a="http://schemas.openxmlformats.org/drawingml/2006/main" xmlns:r="http://schemas.openxmlformats.org/officeDocument/2006/relationships" xmlns:p="http://schemas.openxmlformats.org/presentationml/2006/main">
+  <p:cSld>
+    <p:spTree>
+      <p:nvGrpSpPr>
+        <p:cNvPr id="1" name=""/>
+        <p:cNvGrpSpPr/>
+        <p:nvPr/>
+      </p:nvGrpSpPr>
+      <p:grpSpPr>
+        <a:xfrm>
+          <a:off x="0" y="0"/>
+          <a:ext cx="0" cy="0"/>
+          <a:chOff x="0" y="0"/>
+          <a:chExt cx="0" cy="0"/>
+        </a:xfrm>
+      </p:grpSpPr>
+      <p:sp>
+        <p:nvSpPr>
+          <p:cNvPr id="2" name="Slide Image Placeholder 1"/>
+          <p:cNvSpPr>
+            <a:spLocks noGrp="1" noRot="1" noChangeAspect="1"/>
+          </p:cNvSpPr>
+          <p:nvPr>
+            <p:ph type="sldImg"/>
+          </p:nvPr>
+        </p:nvSpPr>
+        <p:spPr/>
+      </p:sp>
+      <p:sp>
+        <p:nvSpPr>
+          <p:cNvPr id="3" name="Notes Placeholder 2"/>
+          <p:cNvSpPr>
+            <a:spLocks noGrp="1"/>
+          </p:cNvSpPr>
+          <p:nvPr>
+            <p:ph type="body" idx="1"/>
+          </p:nvPr>
+        </p:nvSpPr>
+        <p:spPr/>
+        <p:txBody>
+          <a:bodyPr/>
+          <a:lstStyle/>
+          <a:p>
+            <a:endParaRPr lang="en-GB"/>
+          </a:p>
+        </p:txBody>
+      </p:sp>
+      <p:sp>
+        <p:nvSpPr>
+          <p:cNvPr id="4" name="Slide Number Placeholder 3"/>
+          <p:cNvSpPr>
+            <a:spLocks noGrp="1"/>
+          </p:cNvSpPr>
+          <p:nvPr>
+            <p:ph type="sldNum" sz="quarter" idx="10"/>
+          </p:nvPr>
+        </p:nvSpPr>
+        <p:spPr/>
+        <p:txBody>
+          <a:bodyPr/>
+          <a:lstStyle/>
+          <a:p>
+            <a:fld id="{A4F91ECB-8CB0-401D-A46B-039D51CB393E}" type="slidenum">
+              <a:rPr lang="en-GB" smtClean="0"/>
+              <a:t>10</a:t>
+            </a:fld>
+            <a:endParaRPr lang="en-GB"/>
+          </a:p>
+        </p:txBody>
+      </p:sp>
+    </p:spTree>
+    <p:extLst>
+      <p:ext uri="{BB962C8B-B14F-4D97-AF65-F5344CB8AC3E}">
+        <p14:creationId xmlns:p14="http://schemas.microsoft.com/office/powerpoint/2010/main" val="1667628364"/>
+      </p:ext>
+    </p:extLst>
+  </p:cSld>
+  <p:clrMapOvr>
+    <a:masterClrMapping/>
+  </p:clrMapOvr>
+</p:notes>
+</file>
+
+<file path=ppt/notesSlides/notesSlide11.xml><?xml version="1.0" encoding="utf-8"?>
+<p:notes xmlns:a="http://schemas.openxmlformats.org/drawingml/2006/main" xmlns:r="http://schemas.openxmlformats.org/officeDocument/2006/relationships" xmlns:p="http://schemas.openxmlformats.org/presentationml/2006/main">
+  <p:cSld>
+    <p:spTree>
+      <p:nvGrpSpPr>
+        <p:cNvPr id="1" name=""/>
+        <p:cNvGrpSpPr/>
+        <p:nvPr/>
+      </p:nvGrpSpPr>
+      <p:grpSpPr>
+        <a:xfrm>
+          <a:off x="0" y="0"/>
+          <a:ext cx="0" cy="0"/>
+          <a:chOff x="0" y="0"/>
+          <a:chExt cx="0" cy="0"/>
+        </a:xfrm>
+      </p:grpSpPr>
+      <p:sp>
+        <p:nvSpPr>
+          <p:cNvPr id="2" name="Slide Image Placeholder 1"/>
+          <p:cNvSpPr>
+            <a:spLocks noGrp="1" noRot="1" noChangeAspect="1"/>
+          </p:cNvSpPr>
+          <p:nvPr>
+            <p:ph type="sldImg"/>
+          </p:nvPr>
+        </p:nvSpPr>
+        <p:spPr/>
+      </p:sp>
+      <p:sp>
+        <p:nvSpPr>
+          <p:cNvPr id="3" name="Notes Placeholder 2"/>
+          <p:cNvSpPr>
+            <a:spLocks noGrp="1"/>
+          </p:cNvSpPr>
+          <p:nvPr>
+            <p:ph type="body" idx="1"/>
+          </p:nvPr>
+        </p:nvSpPr>
+        <p:spPr/>
+        <p:txBody>
+          <a:bodyPr/>
+          <a:lstStyle/>
+          <a:p>
+            <a:endParaRPr lang="en-GB"/>
+          </a:p>
+        </p:txBody>
+      </p:sp>
+      <p:sp>
+        <p:nvSpPr>
+          <p:cNvPr id="4" name="Slide Number Placeholder 3"/>
+          <p:cNvSpPr>
+            <a:spLocks noGrp="1"/>
+          </p:cNvSpPr>
+          <p:nvPr>
+            <p:ph type="sldNum" sz="quarter" idx="10"/>
+          </p:nvPr>
+        </p:nvSpPr>
+        <p:spPr/>
+        <p:txBody>
+          <a:bodyPr/>
+          <a:lstStyle/>
+          <a:p>
+            <a:fld id="{A4F91ECB-8CB0-401D-A46B-039D51CB393E}" type="slidenum">
+              <a:rPr lang="en-GB" smtClean="0"/>
+              <a:t>11</a:t>
+            </a:fld>
+            <a:endParaRPr lang="en-GB"/>
+          </a:p>
+        </p:txBody>
+      </p:sp>
+    </p:spTree>
+    <p:extLst>
+      <p:ext uri="{BB962C8B-B14F-4D97-AF65-F5344CB8AC3E}">
+        <p14:creationId xmlns:p14="http://schemas.microsoft.com/office/powerpoint/2010/main" val="3022419149"/>
+      </p:ext>
+    </p:extLst>
+  </p:cSld>
+  <p:clrMapOvr>
+    <a:masterClrMapping/>
+  </p:clrMapOvr>
+</p:notes>
+</file>
+
+<file path=ppt/notesSlides/notesSlide12.xml><?xml version="1.0" encoding="utf-8"?>
+<p:notes xmlns:a="http://schemas.openxmlformats.org/drawingml/2006/main" xmlns:r="http://schemas.openxmlformats.org/officeDocument/2006/relationships" xmlns:p="http://schemas.openxmlformats.org/presentationml/2006/main">
+  <p:cSld>
+    <p:spTree>
+      <p:nvGrpSpPr>
+        <p:cNvPr id="1" name=""/>
+        <p:cNvGrpSpPr/>
+        <p:nvPr/>
+      </p:nvGrpSpPr>
+      <p:grpSpPr>
+        <a:xfrm>
+          <a:off x="0" y="0"/>
+          <a:ext cx="0" cy="0"/>
+          <a:chOff x="0" y="0"/>
+          <a:chExt cx="0" cy="0"/>
+        </a:xfrm>
+      </p:grpSpPr>
+      <p:sp>
+        <p:nvSpPr>
+          <p:cNvPr id="2" name="Slide Image Placeholder 1"/>
+          <p:cNvSpPr>
+            <a:spLocks noGrp="1" noRot="1" noChangeAspect="1"/>
+          </p:cNvSpPr>
+          <p:nvPr>
+            <p:ph type="sldImg"/>
+          </p:nvPr>
+        </p:nvSpPr>
+        <p:spPr/>
+      </p:sp>
+      <p:sp>
+        <p:nvSpPr>
+          <p:cNvPr id="3" name="Notes Placeholder 2"/>
+          <p:cNvSpPr>
+            <a:spLocks noGrp="1"/>
+          </p:cNvSpPr>
+          <p:nvPr>
+            <p:ph type="body" idx="1"/>
+          </p:nvPr>
+        </p:nvSpPr>
+        <p:spPr/>
+        <p:txBody>
+          <a:bodyPr/>
+          <a:lstStyle/>
+          <a:p>
+            <a:endParaRPr lang="en-GB"/>
+          </a:p>
+        </p:txBody>
+      </p:sp>
+      <p:sp>
+        <p:nvSpPr>
+          <p:cNvPr id="4" name="Slide Number Placeholder 3"/>
+          <p:cNvSpPr>
+            <a:spLocks noGrp="1"/>
+          </p:cNvSpPr>
+          <p:nvPr>
+            <p:ph type="sldNum" sz="quarter" idx="10"/>
+          </p:nvPr>
+        </p:nvSpPr>
+        <p:spPr/>
+        <p:txBody>
+          <a:bodyPr/>
+          <a:lstStyle/>
+          <a:p>
+            <a:fld id="{A4F91ECB-8CB0-401D-A46B-039D51CB393E}" type="slidenum">
+              <a:rPr lang="en-GB" smtClean="0"/>
+              <a:t>12</a:t>
+            </a:fld>
+            <a:endParaRPr lang="en-GB"/>
+          </a:p>
+        </p:txBody>
+      </p:sp>
+    </p:spTree>
+    <p:extLst>
+      <p:ext uri="{BB962C8B-B14F-4D97-AF65-F5344CB8AC3E}">
+        <p14:creationId xmlns:p14="http://schemas.microsoft.com/office/powerpoint/2010/main" val="20053630"/>
+      </p:ext>
+    </p:extLst>
+  </p:cSld>
+  <p:clrMapOvr>
+    <a:masterClrMapping/>
+  </p:clrMapOvr>
+</p:notes>
+</file>
+
+<file path=ppt/notesSlides/notesSlide13.xml><?xml version="1.0" encoding="utf-8"?>
+<p:notes xmlns:a="http://schemas.openxmlformats.org/drawingml/2006/main" xmlns:r="http://schemas.openxmlformats.org/officeDocument/2006/relationships" xmlns:p="http://schemas.openxmlformats.org/presentationml/2006/main">
+  <p:cSld>
+    <p:spTree>
+      <p:nvGrpSpPr>
+        <p:cNvPr id="1" name=""/>
+        <p:cNvGrpSpPr/>
+        <p:nvPr/>
+      </p:nvGrpSpPr>
+      <p:grpSpPr>
+        <a:xfrm>
+          <a:off x="0" y="0"/>
+          <a:ext cx="0" cy="0"/>
+          <a:chOff x="0" y="0"/>
+          <a:chExt cx="0" cy="0"/>
+        </a:xfrm>
+      </p:grpSpPr>
+      <p:sp>
+        <p:nvSpPr>
+          <p:cNvPr id="2" name="Slide Image Placeholder 1"/>
+          <p:cNvSpPr>
+            <a:spLocks noGrp="1" noRot="1" noChangeAspect="1"/>
+          </p:cNvSpPr>
+          <p:nvPr>
+            <p:ph type="sldImg"/>
+          </p:nvPr>
+        </p:nvSpPr>
+        <p:spPr/>
+      </p:sp>
+      <p:sp>
+        <p:nvSpPr>
+          <p:cNvPr id="3" name="Notes Placeholder 2"/>
+          <p:cNvSpPr>
+            <a:spLocks noGrp="1"/>
+          </p:cNvSpPr>
+          <p:nvPr>
+            <p:ph type="body" idx="1"/>
+          </p:nvPr>
+        </p:nvSpPr>
+        <p:spPr/>
+        <p:txBody>
+          <a:bodyPr/>
+          <a:lstStyle/>
+          <a:p>
+            <a:endParaRPr lang="en-GB"/>
+          </a:p>
+        </p:txBody>
+      </p:sp>
+      <p:sp>
+        <p:nvSpPr>
+          <p:cNvPr id="4" name="Slide Number Placeholder 3"/>
+          <p:cNvSpPr>
+            <a:spLocks noGrp="1"/>
+          </p:cNvSpPr>
+          <p:nvPr>
+            <p:ph type="sldNum" sz="quarter" idx="10"/>
+          </p:nvPr>
+        </p:nvSpPr>
+        <p:spPr/>
+        <p:txBody>
+          <a:bodyPr/>
+          <a:lstStyle/>
+          <a:p>
+            <a:fld id="{A4F91ECB-8CB0-401D-A46B-039D51CB393E}" type="slidenum">
+              <a:rPr lang="en-GB" smtClean="0"/>
+              <a:t>13</a:t>
+            </a:fld>
+            <a:endParaRPr lang="en-GB"/>
+          </a:p>
+        </p:txBody>
+      </p:sp>
+    </p:spTree>
+    <p:extLst>
+      <p:ext uri="{BB962C8B-B14F-4D97-AF65-F5344CB8AC3E}">
+        <p14:creationId xmlns:p14="http://schemas.microsoft.com/office/powerpoint/2010/main" val="2211029537"/>
+      </p:ext>
+    </p:extLst>
+  </p:cSld>
+  <p:clrMapOvr>
+    <a:masterClrMapping/>
+  </p:clrMapOvr>
+</p:notes>
+</file>
+
+<file path=ppt/notesSlides/notesSlide14.xml><?xml version="1.0" encoding="utf-8"?>
+<p:notes xmlns:a="http://schemas.openxmlformats.org/drawingml/2006/main" xmlns:r="http://schemas.openxmlformats.org/officeDocument/2006/relationships" xmlns:p="http://schemas.openxmlformats.org/presentationml/2006/main">
+  <p:cSld>
+    <p:spTree>
+      <p:nvGrpSpPr>
+        <p:cNvPr id="1" name=""/>
+        <p:cNvGrpSpPr/>
+        <p:nvPr/>
+      </p:nvGrpSpPr>
+      <p:grpSpPr>
+        <a:xfrm>
+          <a:off x="0" y="0"/>
+          <a:ext cx="0" cy="0"/>
+          <a:chOff x="0" y="0"/>
+          <a:chExt cx="0" cy="0"/>
+        </a:xfrm>
+      </p:grpSpPr>
+      <p:sp>
+        <p:nvSpPr>
+          <p:cNvPr id="2" name="Slide Image Placeholder 1"/>
+          <p:cNvSpPr>
+            <a:spLocks noGrp="1" noRot="1" noChangeAspect="1"/>
+          </p:cNvSpPr>
+          <p:nvPr>
+            <p:ph type="sldImg"/>
+          </p:nvPr>
+        </p:nvSpPr>
+        <p:spPr/>
+      </p:sp>
+      <p:sp>
+        <p:nvSpPr>
+          <p:cNvPr id="3" name="Notes Placeholder 2"/>
+          <p:cNvSpPr>
+            <a:spLocks noGrp="1"/>
+          </p:cNvSpPr>
+          <p:nvPr>
+            <p:ph type="body" idx="1"/>
+          </p:nvPr>
+        </p:nvSpPr>
+        <p:spPr/>
+        <p:txBody>
+          <a:bodyPr/>
+          <a:lstStyle/>
+          <a:p>
+            <a:pPr marL="0" marR="0" indent="0" algn="l" defTabSz="914400" rtl="0" eaLnBrk="1" fontAlgn="auto" latinLnBrk="0" hangingPunct="1">
+              <a:lnSpc>
+                <a:spcPct val="100000"/>
+              </a:lnSpc>
+              <a:spcBef>
+                <a:spcPts val="0"/>
+              </a:spcBef>
+              <a:spcAft>
+                <a:spcPts val="0"/>
+              </a:spcAft>
+              <a:buClrTx/>
+              <a:buSzTx/>
+              <a:buFontTx/>
+              <a:buNone/>
+              <a:tabLst/>
+              <a:defRPr/>
+            </a:pPr>
+            <a:r>
+              <a:rPr lang="en-GB" dirty="0" err="1" smtClean="0"/>
+              <a:t>Combinator</a:t>
+            </a:r>
+            <a:r>
+              <a:rPr lang="en-GB" dirty="0" smtClean="0"/>
+              <a:t> methods – see </a:t>
+            </a:r>
+            <a:r>
+              <a:rPr lang="en-US" sz="1200" kern="1200" dirty="0" smtClean="0">
+                <a:solidFill>
+                  <a:schemeClr val="tx1"/>
+                </a:solidFill>
+                <a:effectLst/>
+                <a:latin typeface="+mn-lt"/>
+                <a:ea typeface="+mn-ea"/>
+                <a:cs typeface="+mn-cs"/>
+              </a:rPr>
+              <a:t>The Task-based Asynchronous Pattern</a:t>
+            </a:r>
+            <a:r>
+              <a:rPr lang="en-GB" sz="1200" kern="1200" baseline="0" dirty="0" smtClean="0">
+                <a:solidFill>
+                  <a:schemeClr val="tx1"/>
+                </a:solidFill>
+                <a:effectLst/>
+                <a:latin typeface="+mn-lt"/>
+                <a:ea typeface="+mn-ea"/>
+                <a:cs typeface="+mn-cs"/>
+              </a:rPr>
+              <a:t> </a:t>
+            </a:r>
+            <a:r>
+              <a:rPr lang="en-GB" dirty="0" smtClean="0"/>
+              <a:t>(TAP.docx) from Stephen </a:t>
+            </a:r>
+            <a:r>
+              <a:rPr lang="en-GB" dirty="0" err="1" smtClean="0"/>
+              <a:t>Toub</a:t>
+            </a:r>
+            <a:r>
+              <a:rPr lang="en-GB" smtClean="0"/>
+              <a:t>,</a:t>
+            </a:r>
+            <a:r>
+              <a:rPr lang="en-GB" baseline="0" smtClean="0"/>
+              <a:t> February 2012.</a:t>
+            </a:r>
+            <a:endParaRPr lang="en-GB" dirty="0"/>
+          </a:p>
+        </p:txBody>
+      </p:sp>
+      <p:sp>
+        <p:nvSpPr>
+          <p:cNvPr id="4" name="Slide Number Placeholder 3"/>
+          <p:cNvSpPr>
+            <a:spLocks noGrp="1"/>
+          </p:cNvSpPr>
+          <p:nvPr>
+            <p:ph type="sldNum" sz="quarter" idx="10"/>
+          </p:nvPr>
+        </p:nvSpPr>
+        <p:spPr/>
+        <p:txBody>
+          <a:bodyPr/>
+          <a:lstStyle/>
+          <a:p>
+            <a:fld id="{A4F91ECB-8CB0-401D-A46B-039D51CB393E}" type="slidenum">
+              <a:rPr lang="en-GB" smtClean="0"/>
+              <a:t>14</a:t>
+            </a:fld>
+            <a:endParaRPr lang="en-GB"/>
+          </a:p>
+        </p:txBody>
+      </p:sp>
+    </p:spTree>
+    <p:extLst>
+      <p:ext uri="{BB962C8B-B14F-4D97-AF65-F5344CB8AC3E}">
+        <p14:creationId xmlns:p14="http://schemas.microsoft.com/office/powerpoint/2010/main" val="2363145495"/>
+      </p:ext>
+    </p:extLst>
+  </p:cSld>
+  <p:clrMapOvr>
+    <a:masterClrMapping/>
+  </p:clrMapOvr>
+</p:notes>
+</file>
+
+<file path=ppt/notesSlides/notesSlide15.xml><?xml version="1.0" encoding="utf-8"?>
+<p:notes xmlns:a="http://schemas.openxmlformats.org/drawingml/2006/main" xmlns:r="http://schemas.openxmlformats.org/officeDocument/2006/relationships" xmlns:p="http://schemas.openxmlformats.org/presentationml/2006/main">
+  <p:cSld>
+    <p:spTree>
+      <p:nvGrpSpPr>
+        <p:cNvPr id="1" name=""/>
+        <p:cNvGrpSpPr/>
+        <p:nvPr/>
+      </p:nvGrpSpPr>
+      <p:grpSpPr>
+        <a:xfrm>
+          <a:off x="0" y="0"/>
+          <a:ext cx="0" cy="0"/>
+          <a:chOff x="0" y="0"/>
+          <a:chExt cx="0" cy="0"/>
+        </a:xfrm>
+      </p:grpSpPr>
+      <p:sp>
+        <p:nvSpPr>
+          <p:cNvPr id="2" name="Slide Image Placeholder 1"/>
+          <p:cNvSpPr>
+            <a:spLocks noGrp="1" noRot="1" noChangeAspect="1"/>
+          </p:cNvSpPr>
+          <p:nvPr>
+            <p:ph type="sldImg"/>
+          </p:nvPr>
+        </p:nvSpPr>
+        <p:spPr/>
+      </p:sp>
+      <p:sp>
+        <p:nvSpPr>
+          <p:cNvPr id="3" name="Notes Placeholder 2"/>
+          <p:cNvSpPr>
+            <a:spLocks noGrp="1"/>
+          </p:cNvSpPr>
+          <p:nvPr>
+            <p:ph type="body" idx="1"/>
+          </p:nvPr>
+        </p:nvSpPr>
+        <p:spPr/>
+        <p:txBody>
+          <a:bodyPr/>
+          <a:lstStyle/>
+          <a:p>
+            <a:endParaRPr lang="en-GB"/>
+          </a:p>
+        </p:txBody>
+      </p:sp>
+      <p:sp>
+        <p:nvSpPr>
+          <p:cNvPr id="4" name="Slide Number Placeholder 3"/>
+          <p:cNvSpPr>
+            <a:spLocks noGrp="1"/>
+          </p:cNvSpPr>
+          <p:nvPr>
+            <p:ph type="sldNum" sz="quarter" idx="10"/>
+          </p:nvPr>
+        </p:nvSpPr>
+        <p:spPr/>
+        <p:txBody>
+          <a:bodyPr/>
+          <a:lstStyle/>
+          <a:p>
+            <a:fld id="{A4F91ECB-8CB0-401D-A46B-039D51CB393E}" type="slidenum">
+              <a:rPr lang="en-GB" smtClean="0"/>
+              <a:t>15</a:t>
+            </a:fld>
+            <a:endParaRPr lang="en-GB"/>
+          </a:p>
+        </p:txBody>
+      </p:sp>
+    </p:spTree>
+    <p:extLst>
+      <p:ext uri="{BB962C8B-B14F-4D97-AF65-F5344CB8AC3E}">
+        <p14:creationId xmlns:p14="http://schemas.microsoft.com/office/powerpoint/2010/main" val="1748523469"/>
+      </p:ext>
+    </p:extLst>
+  </p:cSld>
+  <p:clrMapOvr>
+    <a:masterClrMapping/>
+  </p:clrMapOvr>
+</p:notes>
+</file>
+
+<file path=ppt/notesSlides/notesSlide16.xml><?xml version="1.0" encoding="utf-8"?>
+<p:notes xmlns:a="http://schemas.openxmlformats.org/drawingml/2006/main" xmlns:r="http://schemas.openxmlformats.org/officeDocument/2006/relationships" xmlns:p="http://schemas.openxmlformats.org/presentationml/2006/main">
+  <p:cSld>
+    <p:spTree>
+      <p:nvGrpSpPr>
+        <p:cNvPr id="1" name=""/>
+        <p:cNvGrpSpPr/>
+        <p:nvPr/>
+      </p:nvGrpSpPr>
+      <p:grpSpPr>
+        <a:xfrm>
+          <a:off x="0" y="0"/>
+          <a:ext cx="0" cy="0"/>
+          <a:chOff x="0" y="0"/>
+          <a:chExt cx="0" cy="0"/>
+        </a:xfrm>
+      </p:grpSpPr>
+      <p:sp>
+        <p:nvSpPr>
+          <p:cNvPr id="2" name="Slide Image Placeholder 1"/>
+          <p:cNvSpPr>
+            <a:spLocks noGrp="1" noRot="1" noChangeAspect="1"/>
+          </p:cNvSpPr>
+          <p:nvPr>
+            <p:ph type="sldImg"/>
+          </p:nvPr>
+        </p:nvSpPr>
+        <p:spPr/>
+      </p:sp>
+      <p:sp>
+        <p:nvSpPr>
+          <p:cNvPr id="3" name="Notes Placeholder 2"/>
+          <p:cNvSpPr>
+            <a:spLocks noGrp="1"/>
+          </p:cNvSpPr>
+          <p:nvPr>
+            <p:ph type="body" idx="1"/>
+          </p:nvPr>
+        </p:nvSpPr>
+        <p:spPr/>
+        <p:txBody>
+          <a:bodyPr/>
+          <a:lstStyle/>
+          <a:p>
+            <a:endParaRPr lang="en-GB"/>
+          </a:p>
+        </p:txBody>
+      </p:sp>
+      <p:sp>
+        <p:nvSpPr>
+          <p:cNvPr id="4" name="Slide Number Placeholder 3"/>
+          <p:cNvSpPr>
+            <a:spLocks noGrp="1"/>
+          </p:cNvSpPr>
+          <p:nvPr>
+            <p:ph type="sldNum" sz="quarter" idx="10"/>
+          </p:nvPr>
+        </p:nvSpPr>
+        <p:spPr/>
+        <p:txBody>
+          <a:bodyPr/>
+          <a:lstStyle/>
+          <a:p>
+            <a:fld id="{A4F91ECB-8CB0-401D-A46B-039D51CB393E}" type="slidenum">
+              <a:rPr lang="en-GB" smtClean="0"/>
+              <a:t>16</a:t>
+            </a:fld>
+            <a:endParaRPr lang="en-GB"/>
+          </a:p>
+        </p:txBody>
+      </p:sp>
+    </p:spTree>
+    <p:extLst>
+      <p:ext uri="{BB962C8B-B14F-4D97-AF65-F5344CB8AC3E}">
+        <p14:creationId xmlns:p14="http://schemas.microsoft.com/office/powerpoint/2010/main" val="2805279703"/>
+      </p:ext>
+    </p:extLst>
+  </p:cSld>
+  <p:clrMapOvr>
+    <a:masterClrMapping/>
+  </p:clrMapOvr>
+</p:notes>
+</file>
+
+<file path=ppt/notesSlides/notesSlide17.xml><?xml version="1.0" encoding="utf-8"?>
+<p:notes xmlns:a="http://schemas.openxmlformats.org/drawingml/2006/main" xmlns:r="http://schemas.openxmlformats.org/officeDocument/2006/relationships" xmlns:p="http://schemas.openxmlformats.org/presentationml/2006/main">
+  <p:cSld>
+    <p:spTree>
+      <p:nvGrpSpPr>
+        <p:cNvPr id="1" name=""/>
+        <p:cNvGrpSpPr/>
+        <p:nvPr/>
+      </p:nvGrpSpPr>
+      <p:grpSpPr>
+        <a:xfrm>
+          <a:off x="0" y="0"/>
+          <a:ext cx="0" cy="0"/>
+          <a:chOff x="0" y="0"/>
+          <a:chExt cx="0" cy="0"/>
+        </a:xfrm>
+      </p:grpSpPr>
+      <p:sp>
+        <p:nvSpPr>
+          <p:cNvPr id="2" name="Slide Image Placeholder 1"/>
+          <p:cNvSpPr>
+            <a:spLocks noGrp="1" noRot="1" noChangeAspect="1"/>
+          </p:cNvSpPr>
+          <p:nvPr>
+            <p:ph type="sldImg"/>
+          </p:nvPr>
+        </p:nvSpPr>
+        <p:spPr/>
+      </p:sp>
+      <p:sp>
+        <p:nvSpPr>
+          <p:cNvPr id="3" name="Notes Placeholder 2"/>
+          <p:cNvSpPr>
+            <a:spLocks noGrp="1"/>
+          </p:cNvSpPr>
+          <p:nvPr>
+            <p:ph type="body" idx="1"/>
+          </p:nvPr>
+        </p:nvSpPr>
+        <p:spPr/>
+        <p:txBody>
+          <a:bodyPr/>
+          <a:lstStyle/>
+          <a:p>
+            <a:endParaRPr lang="en-GB"/>
+          </a:p>
+        </p:txBody>
+      </p:sp>
+      <p:sp>
+        <p:nvSpPr>
+          <p:cNvPr id="4" name="Slide Number Placeholder 3"/>
+          <p:cNvSpPr>
+            <a:spLocks noGrp="1"/>
+          </p:cNvSpPr>
+          <p:nvPr>
+            <p:ph type="sldNum" sz="quarter" idx="10"/>
+          </p:nvPr>
+        </p:nvSpPr>
+        <p:spPr/>
+        <p:txBody>
+          <a:bodyPr/>
+          <a:lstStyle/>
+          <a:p>
+            <a:fld id="{A4F91ECB-8CB0-401D-A46B-039D51CB393E}" type="slidenum">
+              <a:rPr lang="en-GB" smtClean="0"/>
+              <a:t>17</a:t>
+            </a:fld>
+            <a:endParaRPr lang="en-GB"/>
+          </a:p>
+        </p:txBody>
+      </p:sp>
+    </p:spTree>
+    <p:extLst>
+      <p:ext uri="{BB962C8B-B14F-4D97-AF65-F5344CB8AC3E}">
+        <p14:creationId xmlns:p14="http://schemas.microsoft.com/office/powerpoint/2010/main" val="2468046255"/>
+      </p:ext>
+    </p:extLst>
+  </p:cSld>
+  <p:clrMapOvr>
+    <a:masterClrMapping/>
+  </p:clrMapOvr>
+</p:notes>
+</file>
+
+<file path=ppt/notesSlides/notesSlide18.xml><?xml version="1.0" encoding="utf-8"?>
+<p:notes xmlns:a="http://schemas.openxmlformats.org/drawingml/2006/main" xmlns:r="http://schemas.openxmlformats.org/officeDocument/2006/relationships" xmlns:p="http://schemas.openxmlformats.org/presentationml/2006/main">
+  <p:cSld>
+    <p:spTree>
+      <p:nvGrpSpPr>
+        <p:cNvPr id="1" name=""/>
+        <p:cNvGrpSpPr/>
+        <p:nvPr/>
+      </p:nvGrpSpPr>
+      <p:grpSpPr>
+        <a:xfrm>
+          <a:off x="0" y="0"/>
+          <a:ext cx="0" cy="0"/>
+          <a:chOff x="0" y="0"/>
+          <a:chExt cx="0" cy="0"/>
+        </a:xfrm>
+      </p:grpSpPr>
+      <p:sp>
+        <p:nvSpPr>
+          <p:cNvPr id="2" name="Slide Image Placeholder 1"/>
+          <p:cNvSpPr>
+            <a:spLocks noGrp="1" noRot="1" noChangeAspect="1"/>
+          </p:cNvSpPr>
+          <p:nvPr>
+            <p:ph type="sldImg"/>
+          </p:nvPr>
+        </p:nvSpPr>
+        <p:spPr/>
+      </p:sp>
+      <p:sp>
+        <p:nvSpPr>
+          <p:cNvPr id="3" name="Notes Placeholder 2"/>
+          <p:cNvSpPr>
+            <a:spLocks noGrp="1"/>
+          </p:cNvSpPr>
+          <p:nvPr>
+            <p:ph type="body" idx="1"/>
+          </p:nvPr>
+        </p:nvSpPr>
+        <p:spPr/>
+        <p:txBody>
+          <a:bodyPr/>
+          <a:lstStyle/>
+          <a:p>
+            <a:endParaRPr lang="en-GB"/>
+          </a:p>
+        </p:txBody>
+      </p:sp>
+      <p:sp>
+        <p:nvSpPr>
+          <p:cNvPr id="4" name="Slide Number Placeholder 3"/>
+          <p:cNvSpPr>
+            <a:spLocks noGrp="1"/>
+          </p:cNvSpPr>
+          <p:nvPr>
+            <p:ph type="sldNum" sz="quarter" idx="10"/>
+          </p:nvPr>
+        </p:nvSpPr>
+        <p:spPr/>
+        <p:txBody>
+          <a:bodyPr/>
+          <a:lstStyle/>
+          <a:p>
+            <a:fld id="{A4F91ECB-8CB0-401D-A46B-039D51CB393E}" type="slidenum">
+              <a:rPr lang="en-GB" smtClean="0"/>
+              <a:t>18</a:t>
+            </a:fld>
+            <a:endParaRPr lang="en-GB"/>
+          </a:p>
+        </p:txBody>
+      </p:sp>
+    </p:spTree>
+    <p:extLst>
+      <p:ext uri="{BB962C8B-B14F-4D97-AF65-F5344CB8AC3E}">
+        <p14:creationId xmlns:p14="http://schemas.microsoft.com/office/powerpoint/2010/main" val="3247242816"/>
+      </p:ext>
+    </p:extLst>
+  </p:cSld>
+  <p:clrMapOvr>
+    <a:masterClrMapping/>
+  </p:clrMapOvr>
+</p:notes>
+</file>
+
+<file path=ppt/notesSlides/notesSlide19.xml><?xml version="1.0" encoding="utf-8"?>
+<p:notes xmlns:a="http://schemas.openxmlformats.org/drawingml/2006/main" xmlns:r="http://schemas.openxmlformats.org/officeDocument/2006/relationships" xmlns:p="http://schemas.openxmlformats.org/presentationml/2006/main">
+  <p:cSld>
+    <p:spTree>
+      <p:nvGrpSpPr>
+        <p:cNvPr id="1" name=""/>
+        <p:cNvGrpSpPr/>
+        <p:nvPr/>
+      </p:nvGrpSpPr>
+      <p:grpSpPr>
+        <a:xfrm>
+          <a:off x="0" y="0"/>
+          <a:ext cx="0" cy="0"/>
+          <a:chOff x="0" y="0"/>
+          <a:chExt cx="0" cy="0"/>
+        </a:xfrm>
+      </p:grpSpPr>
+      <p:sp>
+        <p:nvSpPr>
+          <p:cNvPr id="2" name="Slide Image Placeholder 1"/>
+          <p:cNvSpPr>
+            <a:spLocks noGrp="1" noRot="1" noChangeAspect="1"/>
+          </p:cNvSpPr>
+          <p:nvPr>
+            <p:ph type="sldImg"/>
+          </p:nvPr>
+        </p:nvSpPr>
+        <p:spPr/>
+      </p:sp>
+      <p:sp>
+        <p:nvSpPr>
+          <p:cNvPr id="3" name="Notes Placeholder 2"/>
+          <p:cNvSpPr>
+            <a:spLocks noGrp="1"/>
+          </p:cNvSpPr>
+          <p:nvPr>
+            <p:ph type="body" idx="1"/>
+          </p:nvPr>
+        </p:nvSpPr>
+        <p:spPr/>
+        <p:txBody>
+          <a:bodyPr/>
+          <a:lstStyle/>
+          <a:p>
+            <a:endParaRPr lang="en-GB"/>
+          </a:p>
+        </p:txBody>
+      </p:sp>
+      <p:sp>
+        <p:nvSpPr>
+          <p:cNvPr id="4" name="Slide Number Placeholder 3"/>
+          <p:cNvSpPr>
+            <a:spLocks noGrp="1"/>
+          </p:cNvSpPr>
+          <p:nvPr>
+            <p:ph type="sldNum" sz="quarter" idx="10"/>
+          </p:nvPr>
+        </p:nvSpPr>
+        <p:spPr/>
+        <p:txBody>
+          <a:bodyPr/>
+          <a:lstStyle/>
+          <a:p>
+            <a:fld id="{A4F91ECB-8CB0-401D-A46B-039D51CB393E}" type="slidenum">
+              <a:rPr lang="en-GB" smtClean="0"/>
+              <a:t>19</a:t>
+            </a:fld>
+            <a:endParaRPr lang="en-GB"/>
+          </a:p>
+        </p:txBody>
+      </p:sp>
+    </p:spTree>
+    <p:extLst>
+      <p:ext uri="{BB962C8B-B14F-4D97-AF65-F5344CB8AC3E}">
+        <p14:creationId xmlns:p14="http://schemas.microsoft.com/office/powerpoint/2010/main" val="4272726302"/>
+      </p:ext>
+    </p:extLst>
+  </p:cSld>
+  <p:clrMapOvr>
+    <a:masterClrMapping/>
+  </p:clrMapOvr>
+</p:notes>
+</file>
+
+<file path=ppt/notesSlides/notesSlide2.xml><?xml version="1.0" encoding="utf-8"?>
+<p:notes xmlns:a="http://schemas.openxmlformats.org/drawingml/2006/main" xmlns:r="http://schemas.openxmlformats.org/officeDocument/2006/relationships" xmlns:p="http://schemas.openxmlformats.org/presentationml/2006/main">
+  <p:cSld>
+    <p:spTree>
+      <p:nvGrpSpPr>
+        <p:cNvPr id="1" name=""/>
+        <p:cNvGrpSpPr/>
+        <p:nvPr/>
+      </p:nvGrpSpPr>
+      <p:grpSpPr>
+        <a:xfrm>
+          <a:off x="0" y="0"/>
+          <a:ext cx="0" cy="0"/>
+          <a:chOff x="0" y="0"/>
+          <a:chExt cx="0" cy="0"/>
+        </a:xfrm>
+      </p:grpSpPr>
+      <p:sp>
+        <p:nvSpPr>
+          <p:cNvPr id="2" name="Slide Image Placeholder 1"/>
+          <p:cNvSpPr>
+            <a:spLocks noGrp="1" noRot="1" noChangeAspect="1"/>
+          </p:cNvSpPr>
+          <p:nvPr>
+            <p:ph type="sldImg"/>
+          </p:nvPr>
+        </p:nvSpPr>
         <p:spPr>
           <a:xfrm>
             <a:off x="685800" y="1143000"/>
@@ -583,6 +1572,1014 @@
     <p:extLst>
       <p:ext uri="{BB962C8B-B14F-4D97-AF65-F5344CB8AC3E}">
         <p14:creationId xmlns:p14="http://schemas.microsoft.com/office/powerpoint/2010/main" val="1812783515"/>
+      </p:ext>
+    </p:extLst>
+  </p:cSld>
+  <p:clrMapOvr>
+    <a:masterClrMapping/>
+  </p:clrMapOvr>
+</p:notes>
+</file>
+
+<file path=ppt/notesSlides/notesSlide20.xml><?xml version="1.0" encoding="utf-8"?>
+<p:notes xmlns:a="http://schemas.openxmlformats.org/drawingml/2006/main" xmlns:r="http://schemas.openxmlformats.org/officeDocument/2006/relationships" xmlns:p="http://schemas.openxmlformats.org/presentationml/2006/main">
+  <p:cSld>
+    <p:spTree>
+      <p:nvGrpSpPr>
+        <p:cNvPr id="1" name=""/>
+        <p:cNvGrpSpPr/>
+        <p:nvPr/>
+      </p:nvGrpSpPr>
+      <p:grpSpPr>
+        <a:xfrm>
+          <a:off x="0" y="0"/>
+          <a:ext cx="0" cy="0"/>
+          <a:chOff x="0" y="0"/>
+          <a:chExt cx="0" cy="0"/>
+        </a:xfrm>
+      </p:grpSpPr>
+      <p:sp>
+        <p:nvSpPr>
+          <p:cNvPr id="2" name="Slide Image Placeholder 1"/>
+          <p:cNvSpPr>
+            <a:spLocks noGrp="1" noRot="1" noChangeAspect="1"/>
+          </p:cNvSpPr>
+          <p:nvPr>
+            <p:ph type="sldImg"/>
+          </p:nvPr>
+        </p:nvSpPr>
+        <p:spPr/>
+      </p:sp>
+      <p:sp>
+        <p:nvSpPr>
+          <p:cNvPr id="3" name="Notes Placeholder 2"/>
+          <p:cNvSpPr>
+            <a:spLocks noGrp="1"/>
+          </p:cNvSpPr>
+          <p:nvPr>
+            <p:ph type="body" idx="1"/>
+          </p:nvPr>
+        </p:nvSpPr>
+        <p:spPr/>
+        <p:txBody>
+          <a:bodyPr/>
+          <a:lstStyle/>
+          <a:p>
+            <a:endParaRPr lang="en-GB"/>
+          </a:p>
+        </p:txBody>
+      </p:sp>
+      <p:sp>
+        <p:nvSpPr>
+          <p:cNvPr id="4" name="Slide Number Placeholder 3"/>
+          <p:cNvSpPr>
+            <a:spLocks noGrp="1"/>
+          </p:cNvSpPr>
+          <p:nvPr>
+            <p:ph type="sldNum" sz="quarter" idx="10"/>
+          </p:nvPr>
+        </p:nvSpPr>
+        <p:spPr/>
+        <p:txBody>
+          <a:bodyPr/>
+          <a:lstStyle/>
+          <a:p>
+            <a:fld id="{A4F91ECB-8CB0-401D-A46B-039D51CB393E}" type="slidenum">
+              <a:rPr lang="en-GB" smtClean="0"/>
+              <a:t>20</a:t>
+            </a:fld>
+            <a:endParaRPr lang="en-GB"/>
+          </a:p>
+        </p:txBody>
+      </p:sp>
+    </p:spTree>
+    <p:extLst>
+      <p:ext uri="{BB962C8B-B14F-4D97-AF65-F5344CB8AC3E}">
+        <p14:creationId xmlns:p14="http://schemas.microsoft.com/office/powerpoint/2010/main" val="2898569612"/>
+      </p:ext>
+    </p:extLst>
+  </p:cSld>
+  <p:clrMapOvr>
+    <a:masterClrMapping/>
+  </p:clrMapOvr>
+</p:notes>
+</file>
+
+<file path=ppt/notesSlides/notesSlide21.xml><?xml version="1.0" encoding="utf-8"?>
+<p:notes xmlns:a="http://schemas.openxmlformats.org/drawingml/2006/main" xmlns:r="http://schemas.openxmlformats.org/officeDocument/2006/relationships" xmlns:p="http://schemas.openxmlformats.org/presentationml/2006/main">
+  <p:cSld>
+    <p:spTree>
+      <p:nvGrpSpPr>
+        <p:cNvPr id="1" name=""/>
+        <p:cNvGrpSpPr/>
+        <p:nvPr/>
+      </p:nvGrpSpPr>
+      <p:grpSpPr>
+        <a:xfrm>
+          <a:off x="0" y="0"/>
+          <a:ext cx="0" cy="0"/>
+          <a:chOff x="0" y="0"/>
+          <a:chExt cx="0" cy="0"/>
+        </a:xfrm>
+      </p:grpSpPr>
+      <p:sp>
+        <p:nvSpPr>
+          <p:cNvPr id="2" name="Slide Image Placeholder 1"/>
+          <p:cNvSpPr>
+            <a:spLocks noGrp="1" noRot="1" noChangeAspect="1"/>
+          </p:cNvSpPr>
+          <p:nvPr>
+            <p:ph type="sldImg"/>
+          </p:nvPr>
+        </p:nvSpPr>
+        <p:spPr/>
+      </p:sp>
+      <p:sp>
+        <p:nvSpPr>
+          <p:cNvPr id="3" name="Notes Placeholder 2"/>
+          <p:cNvSpPr>
+            <a:spLocks noGrp="1"/>
+          </p:cNvSpPr>
+          <p:nvPr>
+            <p:ph type="body" idx="1"/>
+          </p:nvPr>
+        </p:nvSpPr>
+        <p:spPr/>
+        <p:txBody>
+          <a:bodyPr/>
+          <a:lstStyle/>
+          <a:p>
+            <a:endParaRPr lang="en-GB"/>
+          </a:p>
+        </p:txBody>
+      </p:sp>
+      <p:sp>
+        <p:nvSpPr>
+          <p:cNvPr id="4" name="Slide Number Placeholder 3"/>
+          <p:cNvSpPr>
+            <a:spLocks noGrp="1"/>
+          </p:cNvSpPr>
+          <p:nvPr>
+            <p:ph type="sldNum" sz="quarter" idx="10"/>
+          </p:nvPr>
+        </p:nvSpPr>
+        <p:spPr/>
+        <p:txBody>
+          <a:bodyPr/>
+          <a:lstStyle/>
+          <a:p>
+            <a:fld id="{A4F91ECB-8CB0-401D-A46B-039D51CB393E}" type="slidenum">
+              <a:rPr lang="en-GB" smtClean="0"/>
+              <a:t>21</a:t>
+            </a:fld>
+            <a:endParaRPr lang="en-GB"/>
+          </a:p>
+        </p:txBody>
+      </p:sp>
+    </p:spTree>
+    <p:extLst>
+      <p:ext uri="{BB962C8B-B14F-4D97-AF65-F5344CB8AC3E}">
+        <p14:creationId xmlns:p14="http://schemas.microsoft.com/office/powerpoint/2010/main" val="177981855"/>
+      </p:ext>
+    </p:extLst>
+  </p:cSld>
+  <p:clrMapOvr>
+    <a:masterClrMapping/>
+  </p:clrMapOvr>
+</p:notes>
+</file>
+
+<file path=ppt/notesSlides/notesSlide22.xml><?xml version="1.0" encoding="utf-8"?>
+<p:notes xmlns:a="http://schemas.openxmlformats.org/drawingml/2006/main" xmlns:r="http://schemas.openxmlformats.org/officeDocument/2006/relationships" xmlns:p="http://schemas.openxmlformats.org/presentationml/2006/main">
+  <p:cSld>
+    <p:spTree>
+      <p:nvGrpSpPr>
+        <p:cNvPr id="1" name=""/>
+        <p:cNvGrpSpPr/>
+        <p:nvPr/>
+      </p:nvGrpSpPr>
+      <p:grpSpPr>
+        <a:xfrm>
+          <a:off x="0" y="0"/>
+          <a:ext cx="0" cy="0"/>
+          <a:chOff x="0" y="0"/>
+          <a:chExt cx="0" cy="0"/>
+        </a:xfrm>
+      </p:grpSpPr>
+      <p:sp>
+        <p:nvSpPr>
+          <p:cNvPr id="2" name="Slide Image Placeholder 1"/>
+          <p:cNvSpPr>
+            <a:spLocks noGrp="1" noRot="1" noChangeAspect="1"/>
+          </p:cNvSpPr>
+          <p:nvPr>
+            <p:ph type="sldImg"/>
+          </p:nvPr>
+        </p:nvSpPr>
+        <p:spPr/>
+      </p:sp>
+      <p:sp>
+        <p:nvSpPr>
+          <p:cNvPr id="3" name="Notes Placeholder 2"/>
+          <p:cNvSpPr>
+            <a:spLocks noGrp="1"/>
+          </p:cNvSpPr>
+          <p:nvPr>
+            <p:ph type="body" idx="1"/>
+          </p:nvPr>
+        </p:nvSpPr>
+        <p:spPr/>
+        <p:txBody>
+          <a:bodyPr/>
+          <a:lstStyle/>
+          <a:p>
+            <a:endParaRPr lang="en-GB"/>
+          </a:p>
+        </p:txBody>
+      </p:sp>
+      <p:sp>
+        <p:nvSpPr>
+          <p:cNvPr id="4" name="Slide Number Placeholder 3"/>
+          <p:cNvSpPr>
+            <a:spLocks noGrp="1"/>
+          </p:cNvSpPr>
+          <p:nvPr>
+            <p:ph type="sldNum" sz="quarter" idx="10"/>
+          </p:nvPr>
+        </p:nvSpPr>
+        <p:spPr/>
+        <p:txBody>
+          <a:bodyPr/>
+          <a:lstStyle/>
+          <a:p>
+            <a:fld id="{A4F91ECB-8CB0-401D-A46B-039D51CB393E}" type="slidenum">
+              <a:rPr lang="en-GB" smtClean="0"/>
+              <a:t>22</a:t>
+            </a:fld>
+            <a:endParaRPr lang="en-GB"/>
+          </a:p>
+        </p:txBody>
+      </p:sp>
+    </p:spTree>
+    <p:extLst>
+      <p:ext uri="{BB962C8B-B14F-4D97-AF65-F5344CB8AC3E}">
+        <p14:creationId xmlns:p14="http://schemas.microsoft.com/office/powerpoint/2010/main" val="2577478473"/>
+      </p:ext>
+    </p:extLst>
+  </p:cSld>
+  <p:clrMapOvr>
+    <a:masterClrMapping/>
+  </p:clrMapOvr>
+</p:notes>
+</file>
+
+<file path=ppt/notesSlides/notesSlide23.xml><?xml version="1.0" encoding="utf-8"?>
+<p:notes xmlns:a="http://schemas.openxmlformats.org/drawingml/2006/main" xmlns:r="http://schemas.openxmlformats.org/officeDocument/2006/relationships" xmlns:p="http://schemas.openxmlformats.org/presentationml/2006/main">
+  <p:cSld>
+    <p:spTree>
+      <p:nvGrpSpPr>
+        <p:cNvPr id="1" name=""/>
+        <p:cNvGrpSpPr/>
+        <p:nvPr/>
+      </p:nvGrpSpPr>
+      <p:grpSpPr>
+        <a:xfrm>
+          <a:off x="0" y="0"/>
+          <a:ext cx="0" cy="0"/>
+          <a:chOff x="0" y="0"/>
+          <a:chExt cx="0" cy="0"/>
+        </a:xfrm>
+      </p:grpSpPr>
+      <p:sp>
+        <p:nvSpPr>
+          <p:cNvPr id="2" name="Slide Image Placeholder 1"/>
+          <p:cNvSpPr>
+            <a:spLocks noGrp="1" noRot="1" noChangeAspect="1"/>
+          </p:cNvSpPr>
+          <p:nvPr>
+            <p:ph type="sldImg"/>
+          </p:nvPr>
+        </p:nvSpPr>
+        <p:spPr/>
+      </p:sp>
+      <p:sp>
+        <p:nvSpPr>
+          <p:cNvPr id="3" name="Notes Placeholder 2"/>
+          <p:cNvSpPr>
+            <a:spLocks noGrp="1"/>
+          </p:cNvSpPr>
+          <p:nvPr>
+            <p:ph type="body" idx="1"/>
+          </p:nvPr>
+        </p:nvSpPr>
+        <p:spPr/>
+        <p:txBody>
+          <a:bodyPr/>
+          <a:lstStyle/>
+          <a:p>
+            <a:endParaRPr lang="en-GB"/>
+          </a:p>
+        </p:txBody>
+      </p:sp>
+      <p:sp>
+        <p:nvSpPr>
+          <p:cNvPr id="4" name="Slide Number Placeholder 3"/>
+          <p:cNvSpPr>
+            <a:spLocks noGrp="1"/>
+          </p:cNvSpPr>
+          <p:nvPr>
+            <p:ph type="sldNum" sz="quarter" idx="10"/>
+          </p:nvPr>
+        </p:nvSpPr>
+        <p:spPr/>
+        <p:txBody>
+          <a:bodyPr/>
+          <a:lstStyle/>
+          <a:p>
+            <a:fld id="{A4F91ECB-8CB0-401D-A46B-039D51CB393E}" type="slidenum">
+              <a:rPr lang="en-GB" smtClean="0"/>
+              <a:t>23</a:t>
+            </a:fld>
+            <a:endParaRPr lang="en-GB"/>
+          </a:p>
+        </p:txBody>
+      </p:sp>
+    </p:spTree>
+    <p:extLst>
+      <p:ext uri="{BB962C8B-B14F-4D97-AF65-F5344CB8AC3E}">
+        <p14:creationId xmlns:p14="http://schemas.microsoft.com/office/powerpoint/2010/main" val="466362106"/>
+      </p:ext>
+    </p:extLst>
+  </p:cSld>
+  <p:clrMapOvr>
+    <a:masterClrMapping/>
+  </p:clrMapOvr>
+</p:notes>
+</file>
+
+<file path=ppt/notesSlides/notesSlide24.xml><?xml version="1.0" encoding="utf-8"?>
+<p:notes xmlns:a="http://schemas.openxmlformats.org/drawingml/2006/main" xmlns:r="http://schemas.openxmlformats.org/officeDocument/2006/relationships" xmlns:p="http://schemas.openxmlformats.org/presentationml/2006/main">
+  <p:cSld>
+    <p:spTree>
+      <p:nvGrpSpPr>
+        <p:cNvPr id="1" name=""/>
+        <p:cNvGrpSpPr/>
+        <p:nvPr/>
+      </p:nvGrpSpPr>
+      <p:grpSpPr>
+        <a:xfrm>
+          <a:off x="0" y="0"/>
+          <a:ext cx="0" cy="0"/>
+          <a:chOff x="0" y="0"/>
+          <a:chExt cx="0" cy="0"/>
+        </a:xfrm>
+      </p:grpSpPr>
+      <p:sp>
+        <p:nvSpPr>
+          <p:cNvPr id="2" name="Slide Image Placeholder 1"/>
+          <p:cNvSpPr>
+            <a:spLocks noGrp="1" noRot="1" noChangeAspect="1"/>
+          </p:cNvSpPr>
+          <p:nvPr>
+            <p:ph type="sldImg"/>
+          </p:nvPr>
+        </p:nvSpPr>
+        <p:spPr/>
+      </p:sp>
+      <p:sp>
+        <p:nvSpPr>
+          <p:cNvPr id="3" name="Notes Placeholder 2"/>
+          <p:cNvSpPr>
+            <a:spLocks noGrp="1"/>
+          </p:cNvSpPr>
+          <p:nvPr>
+            <p:ph type="body" idx="1"/>
+          </p:nvPr>
+        </p:nvSpPr>
+        <p:spPr/>
+        <p:txBody>
+          <a:bodyPr/>
+          <a:lstStyle/>
+          <a:p>
+            <a:endParaRPr lang="en-GB"/>
+          </a:p>
+        </p:txBody>
+      </p:sp>
+      <p:sp>
+        <p:nvSpPr>
+          <p:cNvPr id="4" name="Slide Number Placeholder 3"/>
+          <p:cNvSpPr>
+            <a:spLocks noGrp="1"/>
+          </p:cNvSpPr>
+          <p:nvPr>
+            <p:ph type="sldNum" sz="quarter" idx="10"/>
+          </p:nvPr>
+        </p:nvSpPr>
+        <p:spPr/>
+        <p:txBody>
+          <a:bodyPr/>
+          <a:lstStyle/>
+          <a:p>
+            <a:fld id="{A4F91ECB-8CB0-401D-A46B-039D51CB393E}" type="slidenum">
+              <a:rPr lang="en-GB" smtClean="0"/>
+              <a:t>24</a:t>
+            </a:fld>
+            <a:endParaRPr lang="en-GB"/>
+          </a:p>
+        </p:txBody>
+      </p:sp>
+    </p:spTree>
+    <p:extLst>
+      <p:ext uri="{BB962C8B-B14F-4D97-AF65-F5344CB8AC3E}">
+        <p14:creationId xmlns:p14="http://schemas.microsoft.com/office/powerpoint/2010/main" val="4176827256"/>
+      </p:ext>
+    </p:extLst>
+  </p:cSld>
+  <p:clrMapOvr>
+    <a:masterClrMapping/>
+  </p:clrMapOvr>
+</p:notes>
+</file>
+
+<file path=ppt/notesSlides/notesSlide3.xml><?xml version="1.0" encoding="utf-8"?>
+<p:notes xmlns:a="http://schemas.openxmlformats.org/drawingml/2006/main" xmlns:r="http://schemas.openxmlformats.org/officeDocument/2006/relationships" xmlns:p="http://schemas.openxmlformats.org/presentationml/2006/main">
+  <p:cSld>
+    <p:spTree>
+      <p:nvGrpSpPr>
+        <p:cNvPr id="1" name=""/>
+        <p:cNvGrpSpPr/>
+        <p:nvPr/>
+      </p:nvGrpSpPr>
+      <p:grpSpPr>
+        <a:xfrm>
+          <a:off x="0" y="0"/>
+          <a:ext cx="0" cy="0"/>
+          <a:chOff x="0" y="0"/>
+          <a:chExt cx="0" cy="0"/>
+        </a:xfrm>
+      </p:grpSpPr>
+      <p:sp>
+        <p:nvSpPr>
+          <p:cNvPr id="2" name="Slide Image Placeholder 1"/>
+          <p:cNvSpPr>
+            <a:spLocks noGrp="1" noRot="1" noChangeAspect="1"/>
+          </p:cNvSpPr>
+          <p:nvPr>
+            <p:ph type="sldImg"/>
+          </p:nvPr>
+        </p:nvSpPr>
+        <p:spPr/>
+      </p:sp>
+      <p:sp>
+        <p:nvSpPr>
+          <p:cNvPr id="3" name="Notes Placeholder 2"/>
+          <p:cNvSpPr>
+            <a:spLocks noGrp="1"/>
+          </p:cNvSpPr>
+          <p:nvPr>
+            <p:ph type="body" idx="1"/>
+          </p:nvPr>
+        </p:nvSpPr>
+        <p:spPr/>
+        <p:txBody>
+          <a:bodyPr/>
+          <a:lstStyle/>
+          <a:p>
+            <a:endParaRPr lang="en-GB"/>
+          </a:p>
+        </p:txBody>
+      </p:sp>
+      <p:sp>
+        <p:nvSpPr>
+          <p:cNvPr id="4" name="Slide Number Placeholder 3"/>
+          <p:cNvSpPr>
+            <a:spLocks noGrp="1"/>
+          </p:cNvSpPr>
+          <p:nvPr>
+            <p:ph type="sldNum" sz="quarter" idx="10"/>
+          </p:nvPr>
+        </p:nvSpPr>
+        <p:spPr/>
+        <p:txBody>
+          <a:bodyPr/>
+          <a:lstStyle/>
+          <a:p>
+            <a:fld id="{A4F91ECB-8CB0-401D-A46B-039D51CB393E}" type="slidenum">
+              <a:rPr lang="en-GB" smtClean="0"/>
+              <a:t>3</a:t>
+            </a:fld>
+            <a:endParaRPr lang="en-GB"/>
+          </a:p>
+        </p:txBody>
+      </p:sp>
+    </p:spTree>
+    <p:extLst>
+      <p:ext uri="{BB962C8B-B14F-4D97-AF65-F5344CB8AC3E}">
+        <p14:creationId xmlns:p14="http://schemas.microsoft.com/office/powerpoint/2010/main" val="1398471931"/>
+      </p:ext>
+    </p:extLst>
+  </p:cSld>
+  <p:clrMapOvr>
+    <a:masterClrMapping/>
+  </p:clrMapOvr>
+</p:notes>
+</file>
+
+<file path=ppt/notesSlides/notesSlide4.xml><?xml version="1.0" encoding="utf-8"?>
+<p:notes xmlns:a="http://schemas.openxmlformats.org/drawingml/2006/main" xmlns:r="http://schemas.openxmlformats.org/officeDocument/2006/relationships" xmlns:p="http://schemas.openxmlformats.org/presentationml/2006/main">
+  <p:cSld>
+    <p:spTree>
+      <p:nvGrpSpPr>
+        <p:cNvPr id="1" name=""/>
+        <p:cNvGrpSpPr/>
+        <p:nvPr/>
+      </p:nvGrpSpPr>
+      <p:grpSpPr>
+        <a:xfrm>
+          <a:off x="0" y="0"/>
+          <a:ext cx="0" cy="0"/>
+          <a:chOff x="0" y="0"/>
+          <a:chExt cx="0" cy="0"/>
+        </a:xfrm>
+      </p:grpSpPr>
+      <p:sp>
+        <p:nvSpPr>
+          <p:cNvPr id="2" name="Slide Image Placeholder 1"/>
+          <p:cNvSpPr>
+            <a:spLocks noGrp="1" noRot="1" noChangeAspect="1"/>
+          </p:cNvSpPr>
+          <p:nvPr>
+            <p:ph type="sldImg"/>
+          </p:nvPr>
+        </p:nvSpPr>
+        <p:spPr/>
+      </p:sp>
+      <p:sp>
+        <p:nvSpPr>
+          <p:cNvPr id="3" name="Notes Placeholder 2"/>
+          <p:cNvSpPr>
+            <a:spLocks noGrp="1"/>
+          </p:cNvSpPr>
+          <p:nvPr>
+            <p:ph type="body" idx="1"/>
+          </p:nvPr>
+        </p:nvSpPr>
+        <p:spPr/>
+        <p:txBody>
+          <a:bodyPr/>
+          <a:lstStyle/>
+          <a:p>
+            <a:endParaRPr lang="en-GB"/>
+          </a:p>
+        </p:txBody>
+      </p:sp>
+      <p:sp>
+        <p:nvSpPr>
+          <p:cNvPr id="4" name="Slide Number Placeholder 3"/>
+          <p:cNvSpPr>
+            <a:spLocks noGrp="1"/>
+          </p:cNvSpPr>
+          <p:nvPr>
+            <p:ph type="sldNum" sz="quarter" idx="10"/>
+          </p:nvPr>
+        </p:nvSpPr>
+        <p:spPr/>
+        <p:txBody>
+          <a:bodyPr/>
+          <a:lstStyle/>
+          <a:p>
+            <a:fld id="{A4F91ECB-8CB0-401D-A46B-039D51CB393E}" type="slidenum">
+              <a:rPr lang="en-GB" smtClean="0"/>
+              <a:t>4</a:t>
+            </a:fld>
+            <a:endParaRPr lang="en-GB"/>
+          </a:p>
+        </p:txBody>
+      </p:sp>
+    </p:spTree>
+    <p:extLst>
+      <p:ext uri="{BB962C8B-B14F-4D97-AF65-F5344CB8AC3E}">
+        <p14:creationId xmlns:p14="http://schemas.microsoft.com/office/powerpoint/2010/main" val="1495046384"/>
+      </p:ext>
+    </p:extLst>
+  </p:cSld>
+  <p:clrMapOvr>
+    <a:masterClrMapping/>
+  </p:clrMapOvr>
+</p:notes>
+</file>
+
+<file path=ppt/notesSlides/notesSlide5.xml><?xml version="1.0" encoding="utf-8"?>
+<p:notes xmlns:a="http://schemas.openxmlformats.org/drawingml/2006/main" xmlns:r="http://schemas.openxmlformats.org/officeDocument/2006/relationships" xmlns:p="http://schemas.openxmlformats.org/presentationml/2006/main">
+  <p:cSld>
+    <p:spTree>
+      <p:nvGrpSpPr>
+        <p:cNvPr id="1" name=""/>
+        <p:cNvGrpSpPr/>
+        <p:nvPr/>
+      </p:nvGrpSpPr>
+      <p:grpSpPr>
+        <a:xfrm>
+          <a:off x="0" y="0"/>
+          <a:ext cx="0" cy="0"/>
+          <a:chOff x="0" y="0"/>
+          <a:chExt cx="0" cy="0"/>
+        </a:xfrm>
+      </p:grpSpPr>
+      <p:sp>
+        <p:nvSpPr>
+          <p:cNvPr id="2" name="Slide Image Placeholder 1"/>
+          <p:cNvSpPr>
+            <a:spLocks noGrp="1" noRot="1" noChangeAspect="1"/>
+          </p:cNvSpPr>
+          <p:nvPr>
+            <p:ph type="sldImg"/>
+          </p:nvPr>
+        </p:nvSpPr>
+        <p:spPr/>
+      </p:sp>
+      <p:sp>
+        <p:nvSpPr>
+          <p:cNvPr id="3" name="Notes Placeholder 2"/>
+          <p:cNvSpPr>
+            <a:spLocks noGrp="1"/>
+          </p:cNvSpPr>
+          <p:nvPr>
+            <p:ph type="body" idx="1"/>
+          </p:nvPr>
+        </p:nvSpPr>
+        <p:spPr/>
+        <p:txBody>
+          <a:bodyPr/>
+          <a:lstStyle/>
+          <a:p>
+            <a:endParaRPr lang="en-GB"/>
+          </a:p>
+        </p:txBody>
+      </p:sp>
+      <p:sp>
+        <p:nvSpPr>
+          <p:cNvPr id="4" name="Slide Number Placeholder 3"/>
+          <p:cNvSpPr>
+            <a:spLocks noGrp="1"/>
+          </p:cNvSpPr>
+          <p:nvPr>
+            <p:ph type="sldNum" sz="quarter" idx="10"/>
+          </p:nvPr>
+        </p:nvSpPr>
+        <p:spPr/>
+        <p:txBody>
+          <a:bodyPr/>
+          <a:lstStyle/>
+          <a:p>
+            <a:fld id="{A4F91ECB-8CB0-401D-A46B-039D51CB393E}" type="slidenum">
+              <a:rPr lang="en-GB" smtClean="0"/>
+              <a:t>5</a:t>
+            </a:fld>
+            <a:endParaRPr lang="en-GB"/>
+          </a:p>
+        </p:txBody>
+      </p:sp>
+    </p:spTree>
+    <p:extLst>
+      <p:ext uri="{BB962C8B-B14F-4D97-AF65-F5344CB8AC3E}">
+        <p14:creationId xmlns:p14="http://schemas.microsoft.com/office/powerpoint/2010/main" val="592907171"/>
+      </p:ext>
+    </p:extLst>
+  </p:cSld>
+  <p:clrMapOvr>
+    <a:masterClrMapping/>
+  </p:clrMapOvr>
+</p:notes>
+</file>
+
+<file path=ppt/notesSlides/notesSlide6.xml><?xml version="1.0" encoding="utf-8"?>
+<p:notes xmlns:a="http://schemas.openxmlformats.org/drawingml/2006/main" xmlns:r="http://schemas.openxmlformats.org/officeDocument/2006/relationships" xmlns:p="http://schemas.openxmlformats.org/presentationml/2006/main">
+  <p:cSld>
+    <p:spTree>
+      <p:nvGrpSpPr>
+        <p:cNvPr id="1" name=""/>
+        <p:cNvGrpSpPr/>
+        <p:nvPr/>
+      </p:nvGrpSpPr>
+      <p:grpSpPr>
+        <a:xfrm>
+          <a:off x="0" y="0"/>
+          <a:ext cx="0" cy="0"/>
+          <a:chOff x="0" y="0"/>
+          <a:chExt cx="0" cy="0"/>
+        </a:xfrm>
+      </p:grpSpPr>
+      <p:sp>
+        <p:nvSpPr>
+          <p:cNvPr id="2" name="Slide Image Placeholder 1"/>
+          <p:cNvSpPr>
+            <a:spLocks noGrp="1" noRot="1" noChangeAspect="1"/>
+          </p:cNvSpPr>
+          <p:nvPr>
+            <p:ph type="sldImg"/>
+          </p:nvPr>
+        </p:nvSpPr>
+        <p:spPr/>
+      </p:sp>
+      <p:sp>
+        <p:nvSpPr>
+          <p:cNvPr id="3" name="Notes Placeholder 2"/>
+          <p:cNvSpPr>
+            <a:spLocks noGrp="1"/>
+          </p:cNvSpPr>
+          <p:nvPr>
+            <p:ph type="body" idx="1"/>
+          </p:nvPr>
+        </p:nvSpPr>
+        <p:spPr/>
+        <p:txBody>
+          <a:bodyPr/>
+          <a:lstStyle/>
+          <a:p>
+            <a:endParaRPr lang="en-GB"/>
+          </a:p>
+        </p:txBody>
+      </p:sp>
+      <p:sp>
+        <p:nvSpPr>
+          <p:cNvPr id="4" name="Slide Number Placeholder 3"/>
+          <p:cNvSpPr>
+            <a:spLocks noGrp="1"/>
+          </p:cNvSpPr>
+          <p:nvPr>
+            <p:ph type="sldNum" sz="quarter" idx="10"/>
+          </p:nvPr>
+        </p:nvSpPr>
+        <p:spPr/>
+        <p:txBody>
+          <a:bodyPr/>
+          <a:lstStyle/>
+          <a:p>
+            <a:fld id="{A4F91ECB-8CB0-401D-A46B-039D51CB393E}" type="slidenum">
+              <a:rPr lang="en-GB" smtClean="0"/>
+              <a:t>6</a:t>
+            </a:fld>
+            <a:endParaRPr lang="en-GB"/>
+          </a:p>
+        </p:txBody>
+      </p:sp>
+    </p:spTree>
+    <p:extLst>
+      <p:ext uri="{BB962C8B-B14F-4D97-AF65-F5344CB8AC3E}">
+        <p14:creationId xmlns:p14="http://schemas.microsoft.com/office/powerpoint/2010/main" val="1643080199"/>
+      </p:ext>
+    </p:extLst>
+  </p:cSld>
+  <p:clrMapOvr>
+    <a:masterClrMapping/>
+  </p:clrMapOvr>
+</p:notes>
+</file>
+
+<file path=ppt/notesSlides/notesSlide7.xml><?xml version="1.0" encoding="utf-8"?>
+<p:notes xmlns:a="http://schemas.openxmlformats.org/drawingml/2006/main" xmlns:r="http://schemas.openxmlformats.org/officeDocument/2006/relationships" xmlns:p="http://schemas.openxmlformats.org/presentationml/2006/main">
+  <p:cSld>
+    <p:spTree>
+      <p:nvGrpSpPr>
+        <p:cNvPr id="1" name=""/>
+        <p:cNvGrpSpPr/>
+        <p:nvPr/>
+      </p:nvGrpSpPr>
+      <p:grpSpPr>
+        <a:xfrm>
+          <a:off x="0" y="0"/>
+          <a:ext cx="0" cy="0"/>
+          <a:chOff x="0" y="0"/>
+          <a:chExt cx="0" cy="0"/>
+        </a:xfrm>
+      </p:grpSpPr>
+      <p:sp>
+        <p:nvSpPr>
+          <p:cNvPr id="2" name="Slide Image Placeholder 1"/>
+          <p:cNvSpPr>
+            <a:spLocks noGrp="1" noRot="1" noChangeAspect="1"/>
+          </p:cNvSpPr>
+          <p:nvPr>
+            <p:ph type="sldImg"/>
+          </p:nvPr>
+        </p:nvSpPr>
+        <p:spPr/>
+      </p:sp>
+      <p:sp>
+        <p:nvSpPr>
+          <p:cNvPr id="3" name="Notes Placeholder 2"/>
+          <p:cNvSpPr>
+            <a:spLocks noGrp="1"/>
+          </p:cNvSpPr>
+          <p:nvPr>
+            <p:ph type="body" idx="1"/>
+          </p:nvPr>
+        </p:nvSpPr>
+        <p:spPr/>
+        <p:txBody>
+          <a:bodyPr/>
+          <a:lstStyle/>
+          <a:p>
+            <a:endParaRPr lang="en-GB"/>
+          </a:p>
+        </p:txBody>
+      </p:sp>
+      <p:sp>
+        <p:nvSpPr>
+          <p:cNvPr id="4" name="Slide Number Placeholder 3"/>
+          <p:cNvSpPr>
+            <a:spLocks noGrp="1"/>
+          </p:cNvSpPr>
+          <p:nvPr>
+            <p:ph type="sldNum" sz="quarter" idx="10"/>
+          </p:nvPr>
+        </p:nvSpPr>
+        <p:spPr/>
+        <p:txBody>
+          <a:bodyPr/>
+          <a:lstStyle/>
+          <a:p>
+            <a:fld id="{A4F91ECB-8CB0-401D-A46B-039D51CB393E}" type="slidenum">
+              <a:rPr lang="en-GB" smtClean="0"/>
+              <a:t>7</a:t>
+            </a:fld>
+            <a:endParaRPr lang="en-GB"/>
+          </a:p>
+        </p:txBody>
+      </p:sp>
+    </p:spTree>
+    <p:extLst>
+      <p:ext uri="{BB962C8B-B14F-4D97-AF65-F5344CB8AC3E}">
+        <p14:creationId xmlns:p14="http://schemas.microsoft.com/office/powerpoint/2010/main" val="3319717413"/>
+      </p:ext>
+    </p:extLst>
+  </p:cSld>
+  <p:clrMapOvr>
+    <a:masterClrMapping/>
+  </p:clrMapOvr>
+</p:notes>
+</file>
+
+<file path=ppt/notesSlides/notesSlide8.xml><?xml version="1.0" encoding="utf-8"?>
+<p:notes xmlns:a="http://schemas.openxmlformats.org/drawingml/2006/main" xmlns:r="http://schemas.openxmlformats.org/officeDocument/2006/relationships" xmlns:p="http://schemas.openxmlformats.org/presentationml/2006/main">
+  <p:cSld>
+    <p:spTree>
+      <p:nvGrpSpPr>
+        <p:cNvPr id="1" name=""/>
+        <p:cNvGrpSpPr/>
+        <p:nvPr/>
+      </p:nvGrpSpPr>
+      <p:grpSpPr>
+        <a:xfrm>
+          <a:off x="0" y="0"/>
+          <a:ext cx="0" cy="0"/>
+          <a:chOff x="0" y="0"/>
+          <a:chExt cx="0" cy="0"/>
+        </a:xfrm>
+      </p:grpSpPr>
+      <p:sp>
+        <p:nvSpPr>
+          <p:cNvPr id="2" name="Slide Image Placeholder 1"/>
+          <p:cNvSpPr>
+            <a:spLocks noGrp="1" noRot="1" noChangeAspect="1"/>
+          </p:cNvSpPr>
+          <p:nvPr>
+            <p:ph type="sldImg"/>
+          </p:nvPr>
+        </p:nvSpPr>
+        <p:spPr/>
+      </p:sp>
+      <p:sp>
+        <p:nvSpPr>
+          <p:cNvPr id="3" name="Notes Placeholder 2"/>
+          <p:cNvSpPr>
+            <a:spLocks noGrp="1"/>
+          </p:cNvSpPr>
+          <p:nvPr>
+            <p:ph type="body" idx="1"/>
+          </p:nvPr>
+        </p:nvSpPr>
+        <p:spPr/>
+        <p:txBody>
+          <a:bodyPr/>
+          <a:lstStyle/>
+          <a:p>
+            <a:endParaRPr lang="en-GB"/>
+          </a:p>
+        </p:txBody>
+      </p:sp>
+      <p:sp>
+        <p:nvSpPr>
+          <p:cNvPr id="4" name="Slide Number Placeholder 3"/>
+          <p:cNvSpPr>
+            <a:spLocks noGrp="1"/>
+          </p:cNvSpPr>
+          <p:nvPr>
+            <p:ph type="sldNum" sz="quarter" idx="10"/>
+          </p:nvPr>
+        </p:nvSpPr>
+        <p:spPr/>
+        <p:txBody>
+          <a:bodyPr/>
+          <a:lstStyle/>
+          <a:p>
+            <a:fld id="{A4F91ECB-8CB0-401D-A46B-039D51CB393E}" type="slidenum">
+              <a:rPr lang="en-GB" smtClean="0"/>
+              <a:t>8</a:t>
+            </a:fld>
+            <a:endParaRPr lang="en-GB"/>
+          </a:p>
+        </p:txBody>
+      </p:sp>
+    </p:spTree>
+    <p:extLst>
+      <p:ext uri="{BB962C8B-B14F-4D97-AF65-F5344CB8AC3E}">
+        <p14:creationId xmlns:p14="http://schemas.microsoft.com/office/powerpoint/2010/main" val="1073063362"/>
+      </p:ext>
+    </p:extLst>
+  </p:cSld>
+  <p:clrMapOvr>
+    <a:masterClrMapping/>
+  </p:clrMapOvr>
+</p:notes>
+</file>
+
+<file path=ppt/notesSlides/notesSlide9.xml><?xml version="1.0" encoding="utf-8"?>
+<p:notes xmlns:a="http://schemas.openxmlformats.org/drawingml/2006/main" xmlns:r="http://schemas.openxmlformats.org/officeDocument/2006/relationships" xmlns:p="http://schemas.openxmlformats.org/presentationml/2006/main">
+  <p:cSld>
+    <p:spTree>
+      <p:nvGrpSpPr>
+        <p:cNvPr id="1" name=""/>
+        <p:cNvGrpSpPr/>
+        <p:nvPr/>
+      </p:nvGrpSpPr>
+      <p:grpSpPr>
+        <a:xfrm>
+          <a:off x="0" y="0"/>
+          <a:ext cx="0" cy="0"/>
+          <a:chOff x="0" y="0"/>
+          <a:chExt cx="0" cy="0"/>
+        </a:xfrm>
+      </p:grpSpPr>
+      <p:sp>
+        <p:nvSpPr>
+          <p:cNvPr id="2" name="Slide Image Placeholder 1"/>
+          <p:cNvSpPr>
+            <a:spLocks noGrp="1" noRot="1" noChangeAspect="1"/>
+          </p:cNvSpPr>
+          <p:nvPr>
+            <p:ph type="sldImg"/>
+          </p:nvPr>
+        </p:nvSpPr>
+        <p:spPr/>
+      </p:sp>
+      <p:sp>
+        <p:nvSpPr>
+          <p:cNvPr id="3" name="Notes Placeholder 2"/>
+          <p:cNvSpPr>
+            <a:spLocks noGrp="1"/>
+          </p:cNvSpPr>
+          <p:nvPr>
+            <p:ph type="body" idx="1"/>
+          </p:nvPr>
+        </p:nvSpPr>
+        <p:spPr/>
+        <p:txBody>
+          <a:bodyPr/>
+          <a:lstStyle/>
+          <a:p>
+            <a:endParaRPr lang="en-GB"/>
+          </a:p>
+        </p:txBody>
+      </p:sp>
+      <p:sp>
+        <p:nvSpPr>
+          <p:cNvPr id="4" name="Slide Number Placeholder 3"/>
+          <p:cNvSpPr>
+            <a:spLocks noGrp="1"/>
+          </p:cNvSpPr>
+          <p:nvPr>
+            <p:ph type="sldNum" sz="quarter" idx="10"/>
+          </p:nvPr>
+        </p:nvSpPr>
+        <p:spPr/>
+        <p:txBody>
+          <a:bodyPr/>
+          <a:lstStyle/>
+          <a:p>
+            <a:fld id="{A4F91ECB-8CB0-401D-A46B-039D51CB393E}" type="slidenum">
+              <a:rPr lang="en-GB" smtClean="0"/>
+              <a:t>9</a:t>
+            </a:fld>
+            <a:endParaRPr lang="en-GB"/>
+          </a:p>
+        </p:txBody>
+      </p:sp>
+    </p:spTree>
+    <p:extLst>
+      <p:ext uri="{BB962C8B-B14F-4D97-AF65-F5344CB8AC3E}">
+        <p14:creationId xmlns:p14="http://schemas.microsoft.com/office/powerpoint/2010/main" val="804515941"/>
       </p:ext>
     </p:extLst>
   </p:cSld>
@@ -773,7 +2770,7 @@
           <a:p>
             <a:fld id="{062C35B2-88CA-49D3-8E4A-1D75786B8009}" type="datetimeFigureOut">
               <a:rPr lang="en-GB" smtClean="0"/>
-              <a:t>03/06/2014</a:t>
+              <a:t>04/06/2014</a:t>
             </a:fld>
             <a:endParaRPr lang="en-GB"/>
           </a:p>
@@ -943,7 +2940,7 @@
           <a:p>
             <a:fld id="{062C35B2-88CA-49D3-8E4A-1D75786B8009}" type="datetimeFigureOut">
               <a:rPr lang="en-GB" smtClean="0"/>
-              <a:t>03/06/2014</a:t>
+              <a:t>04/06/2014</a:t>
             </a:fld>
             <a:endParaRPr lang="en-GB"/>
           </a:p>
@@ -1123,7 +3120,7 @@
           <a:p>
             <a:fld id="{062C35B2-88CA-49D3-8E4A-1D75786B8009}" type="datetimeFigureOut">
               <a:rPr lang="en-GB" smtClean="0"/>
-              <a:t>03/06/2014</a:t>
+              <a:t>04/06/2014</a:t>
             </a:fld>
             <a:endParaRPr lang="en-GB"/>
           </a:p>
@@ -1293,7 +3290,7 @@
           <a:p>
             <a:fld id="{062C35B2-88CA-49D3-8E4A-1D75786B8009}" type="datetimeFigureOut">
               <a:rPr lang="en-GB" smtClean="0"/>
-              <a:t>03/06/2014</a:t>
+              <a:t>04/06/2014</a:t>
             </a:fld>
             <a:endParaRPr lang="en-GB"/>
           </a:p>
@@ -1539,7 +3536,7 @@
           <a:p>
             <a:fld id="{062C35B2-88CA-49D3-8E4A-1D75786B8009}" type="datetimeFigureOut">
               <a:rPr lang="en-GB" smtClean="0"/>
-              <a:t>03/06/2014</a:t>
+              <a:t>04/06/2014</a:t>
             </a:fld>
             <a:endParaRPr lang="en-GB"/>
           </a:p>
@@ -1827,7 +3824,7 @@
           <a:p>
             <a:fld id="{062C35B2-88CA-49D3-8E4A-1D75786B8009}" type="datetimeFigureOut">
               <a:rPr lang="en-GB" smtClean="0"/>
-              <a:t>03/06/2014</a:t>
+              <a:t>04/06/2014</a:t>
             </a:fld>
             <a:endParaRPr lang="en-GB"/>
           </a:p>
@@ -2249,7 +4246,7 @@
           <a:p>
             <a:fld id="{062C35B2-88CA-49D3-8E4A-1D75786B8009}" type="datetimeFigureOut">
               <a:rPr lang="en-GB" smtClean="0"/>
-              <a:t>03/06/2014</a:t>
+              <a:t>04/06/2014</a:t>
             </a:fld>
             <a:endParaRPr lang="en-GB"/>
           </a:p>
@@ -2367,7 +4364,7 @@
           <a:p>
             <a:fld id="{062C35B2-88CA-49D3-8E4A-1D75786B8009}" type="datetimeFigureOut">
               <a:rPr lang="en-GB" smtClean="0"/>
-              <a:t>03/06/2014</a:t>
+              <a:t>04/06/2014</a:t>
             </a:fld>
             <a:endParaRPr lang="en-GB"/>
           </a:p>
@@ -2462,7 +4459,7 @@
           <a:p>
             <a:fld id="{062C35B2-88CA-49D3-8E4A-1D75786B8009}" type="datetimeFigureOut">
               <a:rPr lang="en-GB" smtClean="0"/>
-              <a:t>03/06/2014</a:t>
+              <a:t>04/06/2014</a:t>
             </a:fld>
             <a:endParaRPr lang="en-GB"/>
           </a:p>
@@ -2739,7 +4736,7 @@
           <a:p>
             <a:fld id="{062C35B2-88CA-49D3-8E4A-1D75786B8009}" type="datetimeFigureOut">
               <a:rPr lang="en-GB" smtClean="0"/>
-              <a:t>03/06/2014</a:t>
+              <a:t>04/06/2014</a:t>
             </a:fld>
             <a:endParaRPr lang="en-GB"/>
           </a:p>
@@ -2992,7 +4989,7 @@
           <a:p>
             <a:fld id="{062C35B2-88CA-49D3-8E4A-1D75786B8009}" type="datetimeFigureOut">
               <a:rPr lang="en-GB" smtClean="0"/>
-              <a:t>03/06/2014</a:t>
+              <a:t>04/06/2014</a:t>
             </a:fld>
             <a:endParaRPr lang="en-GB"/>
           </a:p>
@@ -3208,7 +5205,7 @@
           <a:p>
             <a:fld id="{062C35B2-88CA-49D3-8E4A-1D75786B8009}" type="datetimeFigureOut">
               <a:rPr lang="en-GB" smtClean="0"/>
-              <a:t>03/06/2014</a:t>
+              <a:t>04/06/2014</a:t>
             </a:fld>
             <a:endParaRPr lang="en-GB"/>
           </a:p>
@@ -3729,7 +5726,7 @@
           <p:nvPr/>
         </p:nvPicPr>
         <p:blipFill>
-          <a:blip r:embed="rId2">
+          <a:blip r:embed="rId3">
             <a:extLst>
               <a:ext uri="{28A0092B-C50C-407E-A947-70E740481C1C}">
                 <a14:useLocalDpi xmlns:a14="http://schemas.microsoft.com/office/drawing/2010/main" val="0"/>
@@ -4563,7 +6560,7 @@
           <p:nvPr/>
         </p:nvPicPr>
         <p:blipFill>
-          <a:blip r:embed="rId2"/>
+          <a:blip r:embed="rId3"/>
           <a:stretch>
             <a:fillRect/>
           </a:stretch>
@@ -4888,7 +6885,7 @@
             <p:nvPr/>
           </p:nvPicPr>
           <p:blipFill>
-            <a:blip r:embed="rId3" cstate="print">
+            <a:blip r:embed="rId4" cstate="print">
               <a:extLst>
                 <a:ext uri="{28A0092B-C50C-407E-A947-70E740481C1C}">
                   <a14:useLocalDpi xmlns:a14="http://schemas.microsoft.com/office/drawing/2010/main" val="0"/>
@@ -9435,8 +11432,8 @@
         </p:nvSpPr>
         <p:spPr>
           <a:xfrm>
-            <a:off x="2237041" y="674742"/>
-            <a:ext cx="7717918" cy="4698475"/>
+            <a:off x="0" y="674742"/>
+            <a:ext cx="12192000" cy="4698475"/>
           </a:xfrm>
           <a:prstGeom prst="rect">
             <a:avLst/>
@@ -9594,35 +11591,92 @@
                 <a:cs typeface="Courier New" pitchFamily="49" charset="0"/>
               </a:rPr>
             </a:br>
-            <a:r>
-              <a:rPr lang="en-GB" sz="2400" dirty="0">
+            <a:endParaRPr lang="en-GB" sz="4000" dirty="0" smtClean="0">
+              <a:solidFill>
+                <a:schemeClr val="bg1"/>
+              </a:solidFill>
+              <a:latin typeface="Calibari"/>
+              <a:cs typeface="Courier New" pitchFamily="49" charset="0"/>
+            </a:endParaRPr>
+          </a:p>
+          <a:p>
+            <a:r>
+              <a:rPr lang="en-GB" sz="2600" dirty="0" smtClean="0">
                 <a:solidFill>
                   <a:schemeClr val="bg1"/>
                 </a:solidFill>
                 <a:latin typeface="Calibari"/>
                 <a:cs typeface="Courier New" pitchFamily="49" charset="0"/>
               </a:rPr>
-              <a:t/>
-            </a:r>
-            <a:br>
-              <a:rPr lang="en-GB" sz="2400" dirty="0">
+              <a:t>All </a:t>
+            </a:r>
+            <a:r>
+              <a:rPr lang="en-GB" sz="2600" dirty="0">
                 <a:solidFill>
                   <a:schemeClr val="bg1"/>
                 </a:solidFill>
                 <a:latin typeface="Calibari"/>
                 <a:cs typeface="Courier New" pitchFamily="49" charset="0"/>
               </a:rPr>
-            </a:br>
-            <a:r>
-              <a:rPr lang="en-GB" sz="2800" dirty="0">
+              <a:t>code and slides </a:t>
+            </a:r>
+            <a:r>
+              <a:rPr lang="en-GB" sz="2600" dirty="0" smtClean="0">
                 <a:solidFill>
                   <a:schemeClr val="bg1"/>
                 </a:solidFill>
                 <a:latin typeface="Calibari"/>
                 <a:cs typeface="Courier New" pitchFamily="49" charset="0"/>
               </a:rPr>
-              <a:t>http://geekswithblogs.net/twickers</a:t>
-            </a:r>
+              <a:t>are available </a:t>
+            </a:r>
+            <a:r>
+              <a:rPr lang="en-GB" sz="2600" dirty="0">
+                <a:solidFill>
+                  <a:schemeClr val="bg1"/>
+                </a:solidFill>
+                <a:latin typeface="Calibari"/>
+                <a:cs typeface="Courier New" pitchFamily="49" charset="0"/>
+              </a:rPr>
+              <a:t>at</a:t>
+            </a:r>
+          </a:p>
+          <a:p>
+            <a:endParaRPr lang="en-GB" sz="2200" dirty="0" smtClean="0">
+              <a:solidFill>
+                <a:schemeClr val="bg1"/>
+              </a:solidFill>
+              <a:latin typeface="Calibari"/>
+              <a:cs typeface="Courier New" pitchFamily="49" charset="0"/>
+            </a:endParaRPr>
+          </a:p>
+          <a:p>
+            <a:r>
+              <a:rPr lang="en-GB" sz="3600" dirty="0">
+                <a:solidFill>
+                  <a:schemeClr val="bg1"/>
+                </a:solidFill>
+                <a:latin typeface="Calibari"/>
+                <a:cs typeface="Courier New" pitchFamily="49" charset="0"/>
+              </a:rPr>
+              <a:t>https://github.com/westleyl/NDCOslo-AsyncPatterns</a:t>
+            </a:r>
+            <a:endParaRPr lang="en-GB" sz="5400" dirty="0">
+              <a:solidFill>
+                <a:schemeClr val="bg1"/>
+              </a:solidFill>
+              <a:latin typeface="Calibari"/>
+              <a:cs typeface="Courier New" pitchFamily="49" charset="0"/>
+            </a:endParaRPr>
+          </a:p>
+          <a:p>
+            <a:endParaRPr lang="en-GB" sz="2800" dirty="0">
+              <a:solidFill>
+                <a:schemeClr val="bg1"/>
+              </a:solidFill>
+              <a:latin typeface="Calibari"/>
+              <a:cs typeface="Courier New" pitchFamily="49" charset="0"/>
+            </a:endParaRPr>
           </a:p>
         </p:txBody>
       </p:sp>
@@ -9635,7 +11689,7 @@
           <p:nvPr/>
         </p:nvPicPr>
         <p:blipFill>
-          <a:blip r:embed="rId2">
+          <a:blip r:embed="rId3">
             <a:extLst>
               <a:ext uri="{28A0092B-C50C-407E-A947-70E740481C1C}">
                 <a14:useLocalDpi xmlns:a14="http://schemas.microsoft.com/office/drawing/2010/main" val="0"/>

</xml_diff>